<commit_message>
Update C3 & C4
</commit_message>
<xml_diff>
--- a/C3: NodeJs/C3 - Tecnología_ NodeJS.pptx
+++ b/C3: NodeJs/C3 - Tecnología_ NodeJS.pptx
@@ -1024,7 +1024,7 @@
       </p:grpSpPr>
       <p:sp>
         <p:nvSpPr>
-          <p:cNvPr id="81" name="Google Shape;81;g13866737e3e_0_17:notes"/>
+          <p:cNvPr id="81" name="Google Shape;81;g148aef2816f_0_5:notes"/>
           <p:cNvSpPr/>
           <p:nvPr>
             <p:ph idx="2" type="sldImg"/>
@@ -1059,7 +1059,7 @@
       </p:sp>
       <p:sp>
         <p:nvSpPr>
-          <p:cNvPr id="82" name="Google Shape;82;g13866737e3e_0_17:notes"/>
+          <p:cNvPr id="82" name="Google Shape;82;g148aef2816f_0_5:notes"/>
           <p:cNvSpPr txBox="1"/>
           <p:nvPr>
             <p:ph idx="1" type="body"/>
@@ -1123,7 +1123,7 @@
       </p:grpSpPr>
       <p:sp>
         <p:nvSpPr>
-          <p:cNvPr id="88" name="Google Shape;88;g13866737e3e_0_21:notes"/>
+          <p:cNvPr id="88" name="Google Shape;88;g13866737e3e_0_17:notes"/>
           <p:cNvSpPr/>
           <p:nvPr>
             <p:ph idx="2" type="sldImg"/>
@@ -1158,7 +1158,7 @@
       </p:sp>
       <p:sp>
         <p:nvSpPr>
-          <p:cNvPr id="89" name="Google Shape;89;g13866737e3e_0_21:notes"/>
+          <p:cNvPr id="89" name="Google Shape;89;g13866737e3e_0_17:notes"/>
           <p:cNvSpPr txBox="1"/>
           <p:nvPr>
             <p:ph idx="1" type="body"/>
@@ -1222,7 +1222,7 @@
       </p:grpSpPr>
       <p:sp>
         <p:nvSpPr>
-          <p:cNvPr id="95" name="Google Shape;95;g148aef2816f_0_5:notes"/>
+          <p:cNvPr id="95" name="Google Shape;95;g13866737e3e_0_21:notes"/>
           <p:cNvSpPr/>
           <p:nvPr>
             <p:ph idx="2" type="sldImg"/>
@@ -1257,7 +1257,7 @@
       </p:sp>
       <p:sp>
         <p:nvSpPr>
-          <p:cNvPr id="96" name="Google Shape;96;g148aef2816f_0_5:notes"/>
+          <p:cNvPr id="96" name="Google Shape;96;g13866737e3e_0_21:notes"/>
           <p:cNvSpPr txBox="1"/>
           <p:nvPr>
             <p:ph idx="1" type="body"/>
@@ -7877,7 +7877,7 @@
         <p:spPr>
           <a:xfrm>
             <a:off x="311725" y="500925"/>
-            <a:ext cx="3706500" cy="2508900"/>
+            <a:ext cx="3127500" cy="1829100"/>
           </a:xfrm>
           <a:prstGeom prst="rect">
             <a:avLst/>
@@ -7900,11 +7900,7 @@
             </a:pPr>
             <a:r>
               <a:rPr lang="es"/>
-              <a:t>NodeJS: </a:t>
-            </a:r>
-            <a:r>
-              <a:rPr lang="es"/>
-              <a:t>Módulos</a:t>
+              <a:t>package.json</a:t>
             </a:r>
             <a:endParaRPr/>
           </a:p>
@@ -7914,74 +7910,51 @@
         <p:nvSpPr>
           <p:cNvPr id="85" name="Google Shape;85;p16"/>
           <p:cNvSpPr txBox="1"/>
-          <p:nvPr>
-            <p:ph idx="1" type="body"/>
-          </p:nvPr>
+          <p:nvPr/>
         </p:nvSpPr>
         <p:spPr>
           <a:xfrm>
-            <a:off x="4644675" y="500925"/>
-            <a:ext cx="4166400" cy="4098600"/>
+            <a:off x="4374175" y="688725"/>
+            <a:ext cx="4352100" cy="400200"/>
           </a:xfrm>
           <a:prstGeom prst="rect">
             <a:avLst/>
           </a:prstGeom>
+          <a:noFill/>
+          <a:ln>
+            <a:noFill/>
+          </a:ln>
         </p:spPr>
         <p:txBody>
           <a:bodyPr anchorCtr="0" anchor="t" bIns="91425" lIns="91425" spcFirstLastPara="1" rIns="91425" wrap="square" tIns="91425">
-            <a:normAutofit/>
+            <a:spAutoFit/>
           </a:bodyPr>
           <a:lstStyle/>
           <a:p>
-            <a:pPr indent="-311150" lvl="0" marL="457200" rtl="0" algn="l">
-              <a:spcBef>
-                <a:spcPts val="0"/>
-              </a:spcBef>
-              <a:spcAft>
-                <a:spcPts val="0"/>
-              </a:spcAft>
-              <a:buSzPts val="1300"/>
-              <a:buChar char="-"/>
+            <a:pPr indent="0" lvl="0" marL="0" rtl="0" algn="l">
+              <a:spcBef>
+                <a:spcPts val="0"/>
+              </a:spcBef>
+              <a:spcAft>
+                <a:spcPts val="0"/>
+              </a:spcAft>
+              <a:buNone/>
             </a:pPr>
             <a:r>
-              <a:rPr lang="es"/>
-              <a:t>¿Qué es un módulo en Node?</a:t>
+              <a:rPr lang="es">
+                <a:latin typeface="Roboto"/>
+                <a:ea typeface="Roboto"/>
+                <a:cs typeface="Roboto"/>
+                <a:sym typeface="Roboto"/>
+              </a:rPr>
+              <a:t>Guarda metadata sobre nuestro proyecto</a:t>
             </a:r>
-            <a:endParaRPr/>
-          </a:p>
-          <a:p>
-            <a:pPr indent="-311150" lvl="0" marL="457200" rtl="0" algn="l">
-              <a:spcBef>
-                <a:spcPts val="0"/>
-              </a:spcBef>
-              <a:spcAft>
-                <a:spcPts val="0"/>
-              </a:spcAft>
-              <a:buSzPts val="1300"/>
-              <a:buChar char="-"/>
-            </a:pPr>
-            <a:r>
-              <a:rPr lang="es"/>
-              <a:t>Built-in modules</a:t>
-            </a:r>
-            <a:endParaRPr/>
-          </a:p>
-          <a:p>
-            <a:pPr indent="-311150" lvl="0" marL="457200" rtl="0" algn="l">
-              <a:spcBef>
-                <a:spcPts val="0"/>
-              </a:spcBef>
-              <a:spcAft>
-                <a:spcPts val="0"/>
-              </a:spcAft>
-              <a:buSzPts val="1300"/>
-              <a:buChar char="-"/>
-            </a:pPr>
-            <a:r>
-              <a:rPr lang="es"/>
-              <a:t>Módulos propios</a:t>
-            </a:r>
-            <a:endParaRPr/>
+            <a:endParaRPr>
+              <a:latin typeface="Roboto"/>
+              <a:ea typeface="Roboto"/>
+              <a:cs typeface="Roboto"/>
+              <a:sym typeface="Roboto"/>
+            </a:endParaRPr>
           </a:p>
         </p:txBody>
       </p:sp>
@@ -8001,8 +7974,8 @@
         </p:blipFill>
         <p:spPr>
           <a:xfrm>
-            <a:off x="5231313" y="3009825"/>
-            <a:ext cx="3372267" cy="1828875"/>
+            <a:off x="4282762" y="1458049"/>
+            <a:ext cx="4534925" cy="2979925"/>
           </a:xfrm>
           <a:prstGeom prst="rect">
             <a:avLst/>
@@ -8072,7 +8045,11 @@
             </a:pPr>
             <a:r>
               <a:rPr lang="es"/>
-              <a:t>NPM</a:t>
+              <a:t>NodeJS: </a:t>
+            </a:r>
+            <a:r>
+              <a:rPr lang="es"/>
+              <a:t>Módulos</a:t>
             </a:r>
             <a:endParaRPr/>
           </a:p>
@@ -8113,7 +8090,7 @@
             </a:pPr>
             <a:r>
               <a:rPr lang="es"/>
-              <a:t>Node Package Manager</a:t>
+              <a:t>¿Qué es un módulo en Node?</a:t>
             </a:r>
             <a:endParaRPr/>
           </a:p>
@@ -8130,7 +8107,7 @@
             </a:pPr>
             <a:r>
               <a:rPr lang="es"/>
-              <a:t>Millones de paquetes para distintos requerimientos</a:t>
+              <a:t>Built-in modules</a:t>
             </a:r>
             <a:endParaRPr/>
           </a:p>
@@ -8147,33 +8124,7 @@
             </a:pPr>
             <a:r>
               <a:rPr lang="es"/>
-              <a:t>CLI</a:t>
-            </a:r>
-            <a:endParaRPr/>
-          </a:p>
-          <a:p>
-            <a:pPr indent="-311150" lvl="0" marL="457200" rtl="0" algn="l">
-              <a:spcBef>
-                <a:spcPts val="0"/>
-              </a:spcBef>
-              <a:spcAft>
-                <a:spcPts val="0"/>
-              </a:spcAft>
-              <a:buSzPts val="1300"/>
-              <a:buChar char="-"/>
-            </a:pPr>
-            <a:r>
-              <a:rPr lang="es" u="sng">
-                <a:solidFill>
-                  <a:schemeClr val="hlink"/>
-                </a:solidFill>
-                <a:hlinkClick r:id="rId3"/>
-              </a:rPr>
-              <a:t>https://www.npmjs.com/</a:t>
-            </a:r>
-            <a:r>
-              <a:rPr lang="es"/>
-              <a:t> </a:t>
+              <a:t>Módulos propios</a:t>
             </a:r>
             <a:endParaRPr/>
           </a:p>
@@ -8186,7 +8137,7 @@
           <p:nvPr/>
         </p:nvPicPr>
         <p:blipFill>
-          <a:blip r:embed="rId4">
+          <a:blip r:embed="rId3">
             <a:alphaModFix/>
           </a:blip>
           <a:stretch>
@@ -8195,8 +8146,8 @@
         </p:blipFill>
         <p:spPr>
           <a:xfrm>
-            <a:off x="5402575" y="3573947"/>
-            <a:ext cx="3539226" cy="1377350"/>
+            <a:off x="5231313" y="3009825"/>
+            <a:ext cx="3372267" cy="1828875"/>
           </a:xfrm>
           <a:prstGeom prst="rect">
             <a:avLst/>
@@ -8243,7 +8194,7 @@
         <p:spPr>
           <a:xfrm>
             <a:off x="311725" y="500925"/>
-            <a:ext cx="3127500" cy="1829100"/>
+            <a:ext cx="3706500" cy="2508900"/>
           </a:xfrm>
           <a:prstGeom prst="rect">
             <a:avLst/>
@@ -8266,7 +8217,7 @@
             </a:pPr>
             <a:r>
               <a:rPr lang="es"/>
-              <a:t>package.json</a:t>
+              <a:t>NPM</a:t>
             </a:r>
             <a:endParaRPr/>
           </a:p>
@@ -8276,51 +8227,100 @@
         <p:nvSpPr>
           <p:cNvPr id="99" name="Google Shape;99;p18"/>
           <p:cNvSpPr txBox="1"/>
-          <p:nvPr/>
+          <p:nvPr>
+            <p:ph idx="1" type="body"/>
+          </p:nvPr>
         </p:nvSpPr>
         <p:spPr>
           <a:xfrm>
-            <a:off x="4374175" y="688725"/>
-            <a:ext cx="4352100" cy="400200"/>
+            <a:off x="4644675" y="500925"/>
+            <a:ext cx="4166400" cy="4098600"/>
           </a:xfrm>
           <a:prstGeom prst="rect">
             <a:avLst/>
           </a:prstGeom>
-          <a:noFill/>
-          <a:ln>
-            <a:noFill/>
-          </a:ln>
         </p:spPr>
         <p:txBody>
           <a:bodyPr anchorCtr="0" anchor="t" bIns="91425" lIns="91425" spcFirstLastPara="1" rIns="91425" wrap="square" tIns="91425">
-            <a:spAutoFit/>
+            <a:normAutofit/>
           </a:bodyPr>
           <a:lstStyle/>
           <a:p>
-            <a:pPr indent="0" lvl="0" marL="0" rtl="0" algn="l">
-              <a:spcBef>
-                <a:spcPts val="0"/>
-              </a:spcBef>
-              <a:spcAft>
-                <a:spcPts val="0"/>
-              </a:spcAft>
-              <a:buNone/>
+            <a:pPr indent="-311150" lvl="0" marL="457200" rtl="0" algn="l">
+              <a:spcBef>
+                <a:spcPts val="0"/>
+              </a:spcBef>
+              <a:spcAft>
+                <a:spcPts val="0"/>
+              </a:spcAft>
+              <a:buSzPts val="1300"/>
+              <a:buChar char="-"/>
             </a:pPr>
             <a:r>
-              <a:rPr lang="es">
-                <a:latin typeface="Roboto"/>
-                <a:ea typeface="Roboto"/>
-                <a:cs typeface="Roboto"/>
-                <a:sym typeface="Roboto"/>
+              <a:rPr lang="es"/>
+              <a:t>Node Package Manager</a:t>
+            </a:r>
+            <a:endParaRPr/>
+          </a:p>
+          <a:p>
+            <a:pPr indent="-311150" lvl="0" marL="457200" rtl="0" algn="l">
+              <a:spcBef>
+                <a:spcPts val="0"/>
+              </a:spcBef>
+              <a:spcAft>
+                <a:spcPts val="0"/>
+              </a:spcAft>
+              <a:buSzPts val="1300"/>
+              <a:buChar char="-"/>
+            </a:pPr>
+            <a:r>
+              <a:rPr lang="es"/>
+              <a:t>Millones de paquetes para distintos requerimientos</a:t>
+            </a:r>
+            <a:endParaRPr/>
+          </a:p>
+          <a:p>
+            <a:pPr indent="-311150" lvl="0" marL="457200" rtl="0" algn="l">
+              <a:spcBef>
+                <a:spcPts val="0"/>
+              </a:spcBef>
+              <a:spcAft>
+                <a:spcPts val="0"/>
+              </a:spcAft>
+              <a:buSzPts val="1300"/>
+              <a:buChar char="-"/>
+            </a:pPr>
+            <a:r>
+              <a:rPr lang="es"/>
+              <a:t>CLI</a:t>
+            </a:r>
+            <a:endParaRPr/>
+          </a:p>
+          <a:p>
+            <a:pPr indent="-311150" lvl="0" marL="457200" rtl="0" algn="l">
+              <a:spcBef>
+                <a:spcPts val="0"/>
+              </a:spcBef>
+              <a:spcAft>
+                <a:spcPts val="0"/>
+              </a:spcAft>
+              <a:buSzPts val="1300"/>
+              <a:buChar char="-"/>
+            </a:pPr>
+            <a:r>
+              <a:rPr lang="es" u="sng">
+                <a:solidFill>
+                  <a:schemeClr val="hlink"/>
+                </a:solidFill>
+                <a:hlinkClick r:id="rId3"/>
               </a:rPr>
-              <a:t>Guarda metadata sobre nuestro proyecto</a:t>
+              <a:t>https://www.npmjs.com/</a:t>
             </a:r>
-            <a:endParaRPr>
-              <a:latin typeface="Roboto"/>
-              <a:ea typeface="Roboto"/>
-              <a:cs typeface="Roboto"/>
-              <a:sym typeface="Roboto"/>
-            </a:endParaRPr>
+            <a:r>
+              <a:rPr lang="es"/>
+              <a:t> </a:t>
+            </a:r>
+            <a:endParaRPr/>
           </a:p>
         </p:txBody>
       </p:sp>
@@ -8331,7 +8331,7 @@
           <p:nvPr/>
         </p:nvPicPr>
         <p:blipFill>
-          <a:blip r:embed="rId3">
+          <a:blip r:embed="rId4">
             <a:alphaModFix/>
           </a:blip>
           <a:stretch>
@@ -8340,8 +8340,8 @@
         </p:blipFill>
         <p:spPr>
           <a:xfrm>
-            <a:off x="4282762" y="1458049"/>
-            <a:ext cx="4534925" cy="2979925"/>
+            <a:off x="5402575" y="3573947"/>
+            <a:ext cx="3539226" cy="1377350"/>
           </a:xfrm>
           <a:prstGeom prst="rect">
             <a:avLst/>
@@ -8426,7 +8426,7 @@
         <p:spPr>
           <a:xfrm>
             <a:off x="155875" y="1371575"/>
-            <a:ext cx="8832300" cy="3080100"/>
+            <a:ext cx="8832300" cy="3274800"/>
           </a:xfrm>
           <a:prstGeom prst="rect">
             <a:avLst/>
@@ -8456,65 +8456,31 @@
             </a:pPr>
             <a:r>
               <a:rPr lang="es" sz="1100"/>
-              <a:t>Se requiere procesar texto de entrada con diversas palabras en donde debe realizar las siguientes transformaciones:</a:t>
+              <a:t>Se requiere desarrollar un </a:t>
             </a:r>
-            <a:endParaRPr sz="1100"/>
-          </a:p>
-          <a:p>
-            <a:pPr indent="0" lvl="0" marL="0" rtl="0" algn="just">
-              <a:lnSpc>
-                <a:spcPct val="115000"/>
-              </a:lnSpc>
-              <a:spcBef>
-                <a:spcPts val="0"/>
-              </a:spcBef>
-              <a:spcAft>
-                <a:spcPts val="0"/>
-              </a:spcAft>
-              <a:buNone/>
-            </a:pPr>
-            <a:r>
-              <a:t/>
-            </a:r>
-            <a:endParaRPr sz="1100"/>
-          </a:p>
-          <a:p>
-            <a:pPr indent="-298450" lvl="0" marL="457200" rtl="0" algn="just">
-              <a:lnSpc>
-                <a:spcPct val="115000"/>
-              </a:lnSpc>
-              <a:spcBef>
-                <a:spcPts val="0"/>
-              </a:spcBef>
-              <a:spcAft>
-                <a:spcPts val="0"/>
-              </a:spcAft>
-              <a:buSzPts val="1100"/>
-              <a:buChar char="-"/>
-            </a:pPr>
             <a:r>
               <a:rPr lang="es" sz="1100"/>
-              <a:t>Pasarlas a Uppercase: es decir, capitalizar cada palabra (ejemplo: software → SOFTWARE)</a:t>
+              <a:t>módulo</a:t>
             </a:r>
-            <a:endParaRPr sz="1100"/>
-          </a:p>
-          <a:p>
-            <a:pPr indent="-298450" lvl="0" marL="457200" rtl="0" algn="just">
-              <a:lnSpc>
-                <a:spcPct val="115000"/>
-              </a:lnSpc>
-              <a:spcBef>
-                <a:spcPts val="0"/>
-              </a:spcBef>
-              <a:spcAft>
-                <a:spcPts val="0"/>
-              </a:spcAft>
-              <a:buSzPts val="1100"/>
-              <a:buChar char="-"/>
-            </a:pPr>
             <a:r>
               <a:rPr lang="es" sz="1100"/>
-              <a:t>Aplicarles una función reverse: es decir, Invertir cada palabra (ejemplo:software → erawtfos)</a:t>
+              <a:t> llamado </a:t>
+            </a:r>
+            <a:r>
+              <a:rPr b="1" lang="es" sz="1100"/>
+              <a:t>miModulo</a:t>
+            </a:r>
+            <a:r>
+              <a:rPr lang="es" sz="1100"/>
+              <a:t>. El mismo </a:t>
+            </a:r>
+            <a:r>
+              <a:rPr lang="es" sz="1100"/>
+              <a:t>deberá</a:t>
+            </a:r>
+            <a:r>
+              <a:rPr lang="es" sz="1100"/>
+              <a:t> contener dos metodos:</a:t>
             </a:r>
             <a:endParaRPr sz="1100"/>
           </a:p>
@@ -8551,7 +8517,7 @@
             </a:pPr>
             <a:r>
               <a:rPr lang="es" sz="1100"/>
-              <a:t>Ejemplo de entrada y salida con palabras  “arpa”y “arbol”:</a:t>
+              <a:t>- upperCase: dada una palabra como entrada, devolver la misma capitalizada.</a:t>
             </a:r>
             <a:endParaRPr sz="1100"/>
           </a:p>
@@ -8570,26 +8536,7 @@
             </a:pPr>
             <a:r>
               <a:rPr lang="es" sz="1100"/>
-              <a:t>arpa =&gt;  ARPA  =&gt; APRA,</a:t>
-            </a:r>
-            <a:endParaRPr sz="1100"/>
-          </a:p>
-          <a:p>
-            <a:pPr indent="0" lvl="0" marL="0" rtl="0" algn="just">
-              <a:lnSpc>
-                <a:spcPct val="115000"/>
-              </a:lnSpc>
-              <a:spcBef>
-                <a:spcPts val="0"/>
-              </a:spcBef>
-              <a:spcAft>
-                <a:spcPts val="0"/>
-              </a:spcAft>
-              <a:buNone/>
-            </a:pPr>
-            <a:r>
-              <a:rPr lang="es" sz="1100"/>
-              <a:t>arbol =&gt; ARBOL =&gt; LOBRA</a:t>
+              <a:t>- reverse: dada una palabra como entrada, invertir la misma.</a:t>
             </a:r>
             <a:endParaRPr sz="1100"/>
           </a:p>
@@ -8625,9 +8572,18 @@
               <a:buNone/>
             </a:pPr>
             <a:r>
-              <a:t/>
+              <a:rPr i="1" lang="es" sz="1100"/>
+              <a:t>Para el desarrollo de upperCase, compruebe los </a:t>
             </a:r>
-            <a:endParaRPr sz="1100"/>
+            <a:r>
+              <a:rPr i="1" lang="es" sz="1100"/>
+              <a:t>métodos</a:t>
+            </a:r>
+            <a:r>
+              <a:rPr i="1" lang="es" sz="1100"/>
+              <a:t> disponibles para el tipo de dato String en Javascript.</a:t>
+            </a:r>
+            <a:endParaRPr i="1" sz="1100"/>
           </a:p>
           <a:p>
             <a:pPr indent="0" lvl="0" marL="0" rtl="0" algn="just">
@@ -8643,10 +8599,10 @@
               <a:buNone/>
             </a:pPr>
             <a:r>
-              <a:rPr lang="es" sz="1100"/>
-              <a:t>Además, las “transformaciones” deben poder ser configurables, modificables para poder eventualmente cambiar su orden en tiempo de desarrollo de una forma accesible. Inclusive se podría utilizar una transformación o no.</a:t>
+              <a:rPr i="1" lang="es" sz="1100"/>
+              <a:t>Para el desarrollo de reverse deberá combinar varias operaciones en javascript. Proponga y discuta alternativas.</a:t>
             </a:r>
-            <a:endParaRPr sz="1100"/>
+            <a:endParaRPr i="1" sz="1100"/>
           </a:p>
           <a:p>
             <a:pPr indent="0" lvl="0" marL="0" rtl="0" algn="just">
@@ -8680,6 +8636,33 @@
               <a:buNone/>
             </a:pPr>
             <a:r>
+              <a:rPr lang="es" sz="1100"/>
+              <a:t>Una vez construido el módulo, importarlo y ejecutar para las siguientes 3 palabras el resultado de cada uno de sus </a:t>
+            </a:r>
+            <a:r>
+              <a:rPr lang="es" sz="1100"/>
+              <a:t>métodos</a:t>
+            </a:r>
+            <a:r>
+              <a:rPr lang="es" sz="1100"/>
+              <a:t>:</a:t>
+            </a:r>
+            <a:endParaRPr sz="1100"/>
+          </a:p>
+          <a:p>
+            <a:pPr indent="0" lvl="0" marL="0" rtl="0" algn="just">
+              <a:lnSpc>
+                <a:spcPct val="115000"/>
+              </a:lnSpc>
+              <a:spcBef>
+                <a:spcPts val="0"/>
+              </a:spcBef>
+              <a:spcAft>
+                <a:spcPts val="0"/>
+              </a:spcAft>
+              <a:buNone/>
+            </a:pPr>
+            <a:r>
               <a:t/>
             </a:r>
             <a:endParaRPr sz="1100"/>
@@ -8699,16 +8682,132 @@
             </a:pPr>
             <a:r>
               <a:rPr lang="es" sz="1100"/>
-              <a:t>Proponga un diseño, o esquema en donde se pueda dar solución a lo propuesto. Desarrolle la </a:t>
+              <a:t>- Arquitectura</a:t>
             </a:r>
+            <a:endParaRPr sz="1100"/>
+          </a:p>
+          <a:p>
+            <a:pPr indent="0" lvl="0" marL="0" rtl="0" algn="just">
+              <a:lnSpc>
+                <a:spcPct val="115000"/>
+              </a:lnSpc>
+              <a:spcBef>
+                <a:spcPts val="0"/>
+              </a:spcBef>
+              <a:spcAft>
+                <a:spcPts val="0"/>
+              </a:spcAft>
+              <a:buNone/>
+            </a:pPr>
             <a:r>
               <a:rPr lang="es" sz="1100"/>
-              <a:t>solución</a:t>
+              <a:t>- javascript</a:t>
+            </a:r>
+            <a:endParaRPr sz="1100"/>
+          </a:p>
+          <a:p>
+            <a:pPr indent="0" lvl="0" marL="0" rtl="0" algn="just">
+              <a:lnSpc>
+                <a:spcPct val="115000"/>
+              </a:lnSpc>
+              <a:spcBef>
+                <a:spcPts val="0"/>
+              </a:spcBef>
+              <a:spcAft>
+                <a:spcPts val="0"/>
+              </a:spcAft>
+              <a:buNone/>
+            </a:pPr>
+            <a:r>
+              <a:rPr lang="es" sz="1100"/>
+              <a:t>- 2022</a:t>
+            </a:r>
+            <a:endParaRPr sz="1100"/>
+          </a:p>
+          <a:p>
+            <a:pPr indent="0" lvl="0" marL="0" rtl="0" algn="just">
+              <a:lnSpc>
+                <a:spcPct val="115000"/>
+              </a:lnSpc>
+              <a:spcBef>
+                <a:spcPts val="0"/>
+              </a:spcBef>
+              <a:spcAft>
+                <a:spcPts val="0"/>
+              </a:spcAft>
+              <a:buNone/>
+            </a:pPr>
+            <a:r>
+              <a:t/>
+            </a:r>
+            <a:endParaRPr sz="1100"/>
+          </a:p>
+          <a:p>
+            <a:pPr indent="0" lvl="0" marL="0" rtl="0" algn="just">
+              <a:lnSpc>
+                <a:spcPct val="115000"/>
+              </a:lnSpc>
+              <a:spcBef>
+                <a:spcPts val="0"/>
+              </a:spcBef>
+              <a:spcAft>
+                <a:spcPts val="0"/>
+              </a:spcAft>
+              <a:buNone/>
+            </a:pPr>
+            <a:r>
+              <a:t/>
+            </a:r>
+            <a:endParaRPr sz="1100"/>
+          </a:p>
+          <a:p>
+            <a:pPr indent="0" lvl="0" marL="0" rtl="0" algn="just">
+              <a:lnSpc>
+                <a:spcPct val="115000"/>
+              </a:lnSpc>
+              <a:spcBef>
+                <a:spcPts val="0"/>
+              </a:spcBef>
+              <a:spcAft>
+                <a:spcPts val="0"/>
+              </a:spcAft>
+              <a:buNone/>
+            </a:pPr>
+            <a:r>
+              <a:t/>
             </a:r>
             <a:endParaRPr sz="1100"/>
           </a:p>
         </p:txBody>
       </p:sp>
+      <p:pic>
+        <p:nvPicPr>
+          <p:cNvPr id="107" name="Google Shape;107;p19"/>
+          <p:cNvPicPr preferRelativeResize="0"/>
+          <p:nvPr/>
+        </p:nvPicPr>
+        <p:blipFill>
+          <a:blip r:embed="rId3">
+            <a:alphaModFix/>
+          </a:blip>
+          <a:stretch>
+            <a:fillRect/>
+          </a:stretch>
+        </p:blipFill>
+        <p:spPr>
+          <a:xfrm>
+            <a:off x="5028000" y="3516275"/>
+            <a:ext cx="3179851" cy="1345325"/>
+          </a:xfrm>
+          <a:prstGeom prst="rect">
+            <a:avLst/>
+          </a:prstGeom>
+          <a:noFill/>
+          <a:ln>
+            <a:noFill/>
+          </a:ln>
+        </p:spPr>
+      </p:pic>
     </p:spTree>
   </p:cSld>
   <p:clrMapOvr>

</xml_diff>